<commit_message>
summary and final ppt
</commit_message>
<xml_diff>
--- a/Factors Contributing to Graduation Rates in New Jersey.pptx
+++ b/Factors Contributing to Graduation Rates in New Jersey.pptx
@@ -5,10 +5,10 @@
     <p:sldMasterId id="2147483692" r:id="rId1"/>
   </p:sldMasterIdLst>
   <p:notesMasterIdLst>
-    <p:notesMasterId r:id="rId16"/>
+    <p:notesMasterId r:id="rId17"/>
   </p:notesMasterIdLst>
   <p:handoutMasterIdLst>
-    <p:handoutMasterId r:id="rId17"/>
+    <p:handoutMasterId r:id="rId18"/>
   </p:handoutMasterIdLst>
   <p:sldIdLst>
     <p:sldId id="257" r:id="rId2"/>
@@ -17,14 +17,15 @@
     <p:sldId id="260" r:id="rId5"/>
     <p:sldId id="270" r:id="rId6"/>
     <p:sldId id="261" r:id="rId7"/>
-    <p:sldId id="272" r:id="rId8"/>
-    <p:sldId id="262" r:id="rId9"/>
-    <p:sldId id="263" r:id="rId10"/>
-    <p:sldId id="264" r:id="rId11"/>
-    <p:sldId id="265" r:id="rId12"/>
-    <p:sldId id="267" r:id="rId13"/>
-    <p:sldId id="266" r:id="rId14"/>
-    <p:sldId id="271" r:id="rId15"/>
+    <p:sldId id="273" r:id="rId8"/>
+    <p:sldId id="272" r:id="rId9"/>
+    <p:sldId id="262" r:id="rId10"/>
+    <p:sldId id="263" r:id="rId11"/>
+    <p:sldId id="264" r:id="rId12"/>
+    <p:sldId id="265" r:id="rId13"/>
+    <p:sldId id="267" r:id="rId14"/>
+    <p:sldId id="266" r:id="rId15"/>
+    <p:sldId id="271" r:id="rId16"/>
   </p:sldIdLst>
   <p:sldSz cx="12188825" cy="6858000"/>
   <p:notesSz cx="6858000" cy="9144000"/>
@@ -276,7 +277,7 @@
                   <a:schemeClr val="tx2"/>
                 </a:solidFill>
               </a:rPr>
-              <a:t>1/10/2019</a:t>
+              <a:t>1/11/2019</a:t>
             </a:fld>
             <a:endParaRPr>
               <a:solidFill>
@@ -466,7 +467,7 @@
             <a:fld id="{F95CF31C-F757-429C-A789-86504F04C3BE}" type="datetimeFigureOut">
               <a:rPr lang="en-US"/>
               <a:pPr/>
-              <a:t>1/10/2019</a:t>
+              <a:t>1/11/2019</a:t>
             </a:fld>
             <a:endParaRPr/>
           </a:p>
@@ -1295,7 +1296,7 @@
           <a:p>
             <a:fld id="{5706A09E-12D5-4B1D-B8BB-C300B1DDD423}" type="datetime1">
               <a:rPr lang="en-US" smtClean="0"/>
-              <a:t>1/10/2019</a:t>
+              <a:t>1/11/2019</a:t>
             </a:fld>
             <a:endParaRPr lang="en-US"/>
           </a:p>
@@ -1499,7 +1500,7 @@
           <a:p>
             <a:fld id="{D91CA53D-4C84-40AA-983E-A1E818A7FEFC}" type="datetime1">
               <a:rPr lang="en-US" smtClean="0"/>
-              <a:t>1/10/2019</a:t>
+              <a:t>1/11/2019</a:t>
             </a:fld>
             <a:endParaRPr lang="en-US"/>
           </a:p>
@@ -1712,7 +1713,7 @@
           <a:p>
             <a:fld id="{C8E2FCEE-AE66-4EAB-9C04-97F8A56A6354}" type="datetime1">
               <a:rPr lang="en-US" smtClean="0"/>
-              <a:t>1/10/2019</a:t>
+              <a:t>1/11/2019</a:t>
             </a:fld>
             <a:endParaRPr lang="en-US"/>
           </a:p>
@@ -1913,7 +1914,7 @@
           <a:p>
             <a:fld id="{15A9377B-053C-438C-8A98-92C419A6701C}" type="datetime1">
               <a:rPr lang="en-US" smtClean="0"/>
-              <a:t>1/10/2019</a:t>
+              <a:t>1/11/2019</a:t>
             </a:fld>
             <a:endParaRPr lang="en-US"/>
           </a:p>
@@ -2396,7 +2397,7 @@
           <a:p>
             <a:fld id="{B07CEF46-0123-4A75-9835-49DC49D53DE2}" type="datetime1">
               <a:rPr lang="en-US" smtClean="0"/>
-              <a:t>1/10/2019</a:t>
+              <a:t>1/11/2019</a:t>
             </a:fld>
             <a:endParaRPr lang="en-US"/>
           </a:p>
@@ -2713,7 +2714,7 @@
           <a:p>
             <a:fld id="{62A6378D-18AE-47D1-B10A-42F623B40082}" type="datetime1">
               <a:rPr lang="en-US" smtClean="0"/>
-              <a:t>1/10/2019</a:t>
+              <a:t>1/11/2019</a:t>
             </a:fld>
             <a:endParaRPr lang="en-US"/>
           </a:p>
@@ -3168,7 +3169,7 @@
           <a:p>
             <a:fld id="{321F6AE8-D704-41F6-B16A-5547B5672AC1}" type="datetime1">
               <a:rPr lang="en-US" smtClean="0"/>
-              <a:t>1/10/2019</a:t>
+              <a:t>1/11/2019</a:t>
             </a:fld>
             <a:endParaRPr lang="en-US"/>
           </a:p>
@@ -3301,7 +3302,7 @@
           <a:p>
             <a:fld id="{58AB9538-6F63-4C0B-916D-ED3F4E0A1B28}" type="datetime1">
               <a:rPr lang="en-US" smtClean="0"/>
-              <a:t>1/10/2019</a:t>
+              <a:t>1/11/2019</a:t>
             </a:fld>
             <a:endParaRPr lang="en-US"/>
           </a:p>
@@ -3411,7 +3412,7 @@
           <a:p>
             <a:fld id="{068F15BF-7116-4A9E-8022-5A2DC937F971}" type="datetime1">
               <a:rPr lang="en-US" smtClean="0"/>
-              <a:t>1/10/2019</a:t>
+              <a:t>1/11/2019</a:t>
             </a:fld>
             <a:endParaRPr lang="en-US"/>
           </a:p>
@@ -3775,7 +3776,7 @@
           <a:p>
             <a:fld id="{41B8DC91-5A3B-40CE-8C1D-279A8EF6E008}" type="datetime1">
               <a:rPr lang="en-US" smtClean="0"/>
-              <a:t>1/10/2019</a:t>
+              <a:t>1/11/2019</a:t>
             </a:fld>
             <a:endParaRPr lang="en-US"/>
           </a:p>
@@ -4117,7 +4118,7 @@
           <a:p>
             <a:fld id="{36B7C20A-B94A-4E20-B4B2-88A7825AE904}" type="datetime1">
               <a:rPr lang="en-US" smtClean="0"/>
-              <a:t>1/10/2019</a:t>
+              <a:t>1/11/2019</a:t>
             </a:fld>
             <a:endParaRPr lang="en-US"/>
           </a:p>
@@ -4485,7 +4486,7 @@
             <a:fld id="{859468AF-EFCF-4AAD-ACF4-3BA83EC4AF4E}" type="datetime1">
               <a:rPr lang="en-US" smtClean="0"/>
               <a:pPr/>
-              <a:t>1/10/2019</a:t>
+              <a:t>1/11/2019</a:t>
             </a:fld>
             <a:endParaRPr lang="en-US" dirty="0"/>
           </a:p>
@@ -5180,10 +5181,10 @@
       </p:grpSpPr>
       <p:sp>
         <p:nvSpPr>
-          <p:cNvPr id="8" name="Rectangle 7">
+          <p:cNvPr id="4" name="Rectangle 3">
             <a:extLst>
               <a:ext uri="{FF2B5EF4-FFF2-40B4-BE49-F238E27FC236}">
-                <a16:creationId xmlns:a16="http://schemas.microsoft.com/office/drawing/2014/main" id="{E1211894-A5E2-47EC-A9E6-5FCFC19F7009}"/>
+                <a16:creationId xmlns:a16="http://schemas.microsoft.com/office/drawing/2014/main" id="{70628A52-838D-40B7-81C9-0569CD9B66D2}"/>
               </a:ext>
             </a:extLst>
           </p:cNvPr>
@@ -5192,15 +5193,15 @@
         </p:nvSpPr>
         <p:spPr>
           <a:xfrm>
-            <a:off x="1557561" y="228600"/>
-            <a:ext cx="9296400" cy="461665"/>
+            <a:off x="2970212" y="228600"/>
+            <a:ext cx="6474849" cy="461665"/>
           </a:xfrm>
           <a:prstGeom prst="rect">
             <a:avLst/>
           </a:prstGeom>
         </p:spPr>
         <p:txBody>
-          <a:bodyPr wrap="square">
+          <a:bodyPr wrap="none">
             <a:spAutoFit/>
           </a:bodyPr>
           <a:lstStyle/>
@@ -5212,30 +5213,18 @@
                     <a:lumMod val="75000"/>
                   </a:schemeClr>
                 </a:solidFill>
-                <a:latin typeface="+mj-lt"/>
-                <a:ea typeface="Times New Roman" panose="02020603050405020304" pitchFamily="18" charset="0"/>
               </a:rPr>
-              <a:t>Administrator and Superintendent Salary vs Graduation Rate</a:t>
-            </a:r>
-            <a:endParaRPr lang="en-US" sz="1800" dirty="0">
-              <a:solidFill>
-                <a:schemeClr val="accent2">
-                  <a:lumMod val="75000"/>
-                </a:schemeClr>
-              </a:solidFill>
-              <a:effectLst/>
-              <a:latin typeface="+mj-lt"/>
-              <a:ea typeface="Times New Roman" panose="02020603050405020304" pitchFamily="18" charset="0"/>
-            </a:endParaRPr>
+              <a:t>Combined Demographics with Population</a:t>
+            </a:r>
           </a:p>
         </p:txBody>
       </p:sp>
       <p:pic>
         <p:nvPicPr>
-          <p:cNvPr id="9" name="Picture 8">
+          <p:cNvPr id="5" name="Picture 4">
             <a:extLst>
               <a:ext uri="{FF2B5EF4-FFF2-40B4-BE49-F238E27FC236}">
-                <a16:creationId xmlns:a16="http://schemas.microsoft.com/office/drawing/2014/main" id="{9BECF749-39A1-4C01-85C9-9B8036063768}"/>
+                <a16:creationId xmlns:a16="http://schemas.microsoft.com/office/drawing/2014/main" id="{881045C0-A6AB-4A93-B906-F811DECE87B7}"/>
               </a:ext>
             </a:extLst>
           </p:cNvPr>
@@ -5252,8 +5241,162 @@
         </p:blipFill>
         <p:spPr>
           <a:xfrm>
-            <a:off x="1369616" y="914400"/>
-            <a:ext cx="9449591" cy="5390259"/>
+            <a:off x="475800" y="838200"/>
+            <a:ext cx="11237224" cy="5512410"/>
+          </a:xfrm>
+          <a:prstGeom prst="rect">
+            <a:avLst/>
+          </a:prstGeom>
+          <a:solidFill>
+            <a:srgbClr val="FFFFFF">
+              <a:shade val="85000"/>
+            </a:srgbClr>
+          </a:solidFill>
+          <a:ln w="88900" cap="sq">
+            <a:solidFill>
+              <a:srgbClr val="FFFFFF"/>
+            </a:solidFill>
+            <a:miter lim="800000"/>
+          </a:ln>
+          <a:effectLst>
+            <a:outerShdw blurRad="55000" dist="18000" dir="5400000" algn="tl" rotWithShape="0">
+              <a:srgbClr val="000000">
+                <a:alpha val="40000"/>
+              </a:srgbClr>
+            </a:outerShdw>
+          </a:effectLst>
+          <a:scene3d>
+            <a:camera prst="orthographicFront"/>
+            <a:lightRig rig="twoPt" dir="t">
+              <a:rot lat="0" lon="0" rev="7200000"/>
+            </a:lightRig>
+          </a:scene3d>
+          <a:sp3d>
+            <a:bevelT w="25400" h="19050"/>
+            <a:contourClr>
+              <a:srgbClr val="FFFFFF"/>
+            </a:contourClr>
+          </a:sp3d>
+        </p:spPr>
+      </p:pic>
+    </p:spTree>
+    <p:extLst>
+      <p:ext uri="{BB962C8B-B14F-4D97-AF65-F5344CB8AC3E}">
+        <p14:creationId xmlns:p14="http://schemas.microsoft.com/office/powerpoint/2010/main" val="977229791"/>
+      </p:ext>
+    </p:extLst>
+  </p:cSld>
+  <p:clrMapOvr>
+    <a:masterClrMapping/>
+  </p:clrMapOvr>
+  <mc:AlternateContent xmlns:mc="http://schemas.openxmlformats.org/markup-compatibility/2006" xmlns:p14="http://schemas.microsoft.com/office/powerpoint/2010/main">
+    <mc:Choice Requires="p14">
+      <p:transition spd="med" p14:dur="700">
+        <p:fade/>
+      </p:transition>
+    </mc:Choice>
+    <mc:Fallback xmlns="">
+      <p:transition spd="med">
+        <p:fade/>
+      </p:transition>
+    </mc:Fallback>
+  </mc:AlternateContent>
+</p:sld>
+</file>
+
+<file path=ppt/slides/slide11.xml><?xml version="1.0" encoding="utf-8"?>
+<p:sld xmlns:a="http://schemas.openxmlformats.org/drawingml/2006/main" xmlns:r="http://schemas.openxmlformats.org/officeDocument/2006/relationships" xmlns:p="http://schemas.openxmlformats.org/presentationml/2006/main">
+  <p:cSld>
+    <p:spTree>
+      <p:nvGrpSpPr>
+        <p:cNvPr id="1" name=""/>
+        <p:cNvGrpSpPr/>
+        <p:nvPr/>
+      </p:nvGrpSpPr>
+      <p:grpSpPr>
+        <a:xfrm>
+          <a:off x="0" y="0"/>
+          <a:ext cx="0" cy="0"/>
+          <a:chOff x="0" y="0"/>
+          <a:chExt cx="0" cy="0"/>
+        </a:xfrm>
+      </p:grpSpPr>
+      <p:sp>
+        <p:nvSpPr>
+          <p:cNvPr id="8" name="Rectangle 7">
+            <a:extLst>
+              <a:ext uri="{FF2B5EF4-FFF2-40B4-BE49-F238E27FC236}">
+                <a16:creationId xmlns:a16="http://schemas.microsoft.com/office/drawing/2014/main" id="{E1211894-A5E2-47EC-A9E6-5FCFC19F7009}"/>
+              </a:ext>
+            </a:extLst>
+          </p:cNvPr>
+          <p:cNvSpPr/>
+          <p:nvPr/>
+        </p:nvSpPr>
+        <p:spPr>
+          <a:xfrm>
+            <a:off x="1394991" y="322508"/>
+            <a:ext cx="9296400" cy="461665"/>
+          </a:xfrm>
+          <a:prstGeom prst="rect">
+            <a:avLst/>
+          </a:prstGeom>
+        </p:spPr>
+        <p:txBody>
+          <a:bodyPr wrap="square">
+            <a:spAutoFit/>
+          </a:bodyPr>
+          <a:lstStyle/>
+          <a:p>
+            <a:r>
+              <a:rPr lang="en-US" dirty="0">
+                <a:solidFill>
+                  <a:schemeClr val="accent2">
+                    <a:lumMod val="75000"/>
+                  </a:schemeClr>
+                </a:solidFill>
+                <a:latin typeface="+mj-lt"/>
+                <a:ea typeface="Times New Roman" panose="02020603050405020304" pitchFamily="18" charset="0"/>
+              </a:rPr>
+              <a:t>Administrator and Superintendent Salary vs Graduation Rate</a:t>
+            </a:r>
+            <a:endParaRPr lang="en-US" sz="1800" dirty="0">
+              <a:solidFill>
+                <a:schemeClr val="accent2">
+                  <a:lumMod val="75000"/>
+                </a:schemeClr>
+              </a:solidFill>
+              <a:effectLst/>
+              <a:latin typeface="+mj-lt"/>
+              <a:ea typeface="Times New Roman" panose="02020603050405020304" pitchFamily="18" charset="0"/>
+            </a:endParaRPr>
+          </a:p>
+        </p:txBody>
+      </p:sp>
+      <p:pic>
+        <p:nvPicPr>
+          <p:cNvPr id="3" name="Picture 2">
+            <a:extLst>
+              <a:ext uri="{FF2B5EF4-FFF2-40B4-BE49-F238E27FC236}">
+                <a16:creationId xmlns:a16="http://schemas.microsoft.com/office/drawing/2014/main" id="{790A7263-940F-4A26-8586-7707C28E8D4F}"/>
+              </a:ext>
+            </a:extLst>
+          </p:cNvPr>
+          <p:cNvPicPr>
+            <a:picLocks noChangeAspect="1"/>
+          </p:cNvPicPr>
+          <p:nvPr/>
+        </p:nvPicPr>
+        <p:blipFill>
+          <a:blip r:embed="rId2"/>
+          <a:stretch>
+            <a:fillRect/>
+          </a:stretch>
+        </p:blipFill>
+        <p:spPr>
+          <a:xfrm>
+            <a:off x="608012" y="1066800"/>
+            <a:ext cx="10590212" cy="5295106"/>
           </a:xfrm>
           <a:prstGeom prst="rect">
             <a:avLst/>
@@ -5315,7 +5458,7 @@
 </p:sld>
 </file>
 
-<file path=ppt/slides/slide11.xml><?xml version="1.0" encoding="utf-8"?>
+<file path=ppt/slides/slide12.xml><?xml version="1.0" encoding="utf-8"?>
 <p:sld xmlns:a="http://schemas.openxmlformats.org/drawingml/2006/main" xmlns:r="http://schemas.openxmlformats.org/officeDocument/2006/relationships" xmlns:p="http://schemas.openxmlformats.org/presentationml/2006/main">
   <p:cSld>
     <p:spTree>
@@ -5466,7 +5609,7 @@
         </p:nvSpPr>
         <p:spPr>
           <a:xfrm>
-            <a:off x="8997803" y="914400"/>
+            <a:off x="8837612" y="990600"/>
             <a:ext cx="2667000" cy="1200329"/>
           </a:xfrm>
           <a:prstGeom prst="rect">
@@ -5519,7 +5662,7 @@
         </p:nvSpPr>
         <p:spPr>
           <a:xfrm>
-            <a:off x="760412" y="4669758"/>
+            <a:off x="760412" y="4416130"/>
             <a:ext cx="2667000" cy="1569660"/>
           </a:xfrm>
           <a:prstGeom prst="rect">
@@ -5543,7 +5686,7 @@
                 <a:latin typeface="+mj-lt"/>
                 <a:ea typeface="Times New Roman" panose="02020603050405020304" pitchFamily="18" charset="0"/>
               </a:rPr>
-              <a:t>Teachers’ Effectiveness vs Graduation Rate</a:t>
+              <a:t>Teachers’ Experience vs Graduation Rate</a:t>
             </a:r>
             <a:endParaRPr lang="en-US" sz="1800" dirty="0">
               <a:solidFill>
@@ -5583,7 +5726,7 @@
 </p:sld>
 </file>
 
-<file path=ppt/slides/slide12.xml><?xml version="1.0" encoding="utf-8"?>
+<file path=ppt/slides/slide13.xml><?xml version="1.0" encoding="utf-8"?>
 <p:sld xmlns:a="http://schemas.openxmlformats.org/drawingml/2006/main" xmlns:r="http://schemas.openxmlformats.org/officeDocument/2006/relationships" xmlns:p="http://schemas.openxmlformats.org/presentationml/2006/main">
   <p:cSld>
     <p:spTree>
@@ -5738,7 +5881,7 @@
 </p:sld>
 </file>
 
-<file path=ppt/slides/slide13.xml><?xml version="1.0" encoding="utf-8"?>
+<file path=ppt/slides/slide14.xml><?xml version="1.0" encoding="utf-8"?>
 <p:sld xmlns:a="http://schemas.openxmlformats.org/drawingml/2006/main" xmlns:r="http://schemas.openxmlformats.org/officeDocument/2006/relationships" xmlns:p="http://schemas.openxmlformats.org/presentationml/2006/main">
   <p:cSld>
     <p:spTree>
@@ -5769,7 +5912,7 @@
         </p:nvSpPr>
         <p:spPr>
           <a:xfrm>
-            <a:off x="3719704" y="828823"/>
+            <a:off x="3530920" y="865165"/>
             <a:ext cx="2374708" cy="1200329"/>
           </a:xfrm>
           <a:prstGeom prst="rect">
@@ -6004,7 +6147,7 @@
 </p:sld>
 </file>
 
-<file path=ppt/slides/slide14.xml><?xml version="1.0" encoding="utf-8"?>
+<file path=ppt/slides/slide15.xml><?xml version="1.0" encoding="utf-8"?>
 <p:sld xmlns:a="http://schemas.openxmlformats.org/drawingml/2006/main" xmlns:r="http://schemas.openxmlformats.org/officeDocument/2006/relationships" xmlns:p="http://schemas.openxmlformats.org/presentationml/2006/main">
   <p:cSld>
     <p:spTree>
@@ -6302,13 +6445,8 @@
             <a:pPr lvl="1"/>
             <a:r>
               <a:rPr lang="en-US" dirty="0"/>
-              <a:t>Deepali </a:t>
-            </a:r>
-            <a:r>
-              <a:rPr lang="en-US" dirty="0" err="1"/>
-              <a:t>Khaparde</a:t>
-            </a:r>
-            <a:endParaRPr lang="en-US" dirty="0"/>
+              <a:t>Deepali Khaparde</a:t>
+            </a:r>
           </a:p>
           <a:p>
             <a:pPr lvl="1"/>
@@ -6327,12 +6465,8 @@
           <a:p>
             <a:pPr lvl="1"/>
             <a:r>
-              <a:rPr lang="en-US" dirty="0" err="1"/>
-              <a:t>Raghi</a:t>
-            </a:r>
-            <a:r>
               <a:rPr lang="en-US" dirty="0"/>
-              <a:t> Ramachandran</a:t>
+              <a:t>Raghi Ramachandran</a:t>
             </a:r>
           </a:p>
           <a:p>
@@ -6357,7 +6491,7 @@
         </p:nvSpPr>
         <p:spPr>
           <a:xfrm>
-            <a:off x="5693238" y="268669"/>
+            <a:off x="5863055" y="303664"/>
             <a:ext cx="5205701" cy="787399"/>
           </a:xfrm>
           <a:prstGeom prst="rect">
@@ -8933,7 +9067,7 @@
           <a:p>
             <a:r>
               <a:rPr lang="en-US" dirty="0"/>
-              <a:t>Clean Data</a:t>
+              <a:t>Cleaned Data</a:t>
             </a:r>
           </a:p>
           <a:p>
@@ -9237,7 +9371,7 @@
           <a:p>
             <a:r>
               <a:rPr lang="en-US" dirty="0"/>
-              <a:t>Get to Work!</a:t>
+              <a:t>Got to Work!</a:t>
             </a:r>
           </a:p>
           <a:p>
@@ -9317,10 +9451,10 @@
       </p:sp>
       <p:pic>
         <p:nvPicPr>
-          <p:cNvPr id="10" name="Picture 9">
+          <p:cNvPr id="4" name="Picture 3">
             <a:extLst>
               <a:ext uri="{FF2B5EF4-FFF2-40B4-BE49-F238E27FC236}">
-                <a16:creationId xmlns:a16="http://schemas.microsoft.com/office/drawing/2014/main" id="{6A9D906F-F6A5-477C-8141-9CEE08729768}"/>
+                <a16:creationId xmlns:a16="http://schemas.microsoft.com/office/drawing/2014/main" id="{94E6F2F9-748C-4E6D-BBBD-8EEC335C3643}"/>
               </a:ext>
             </a:extLst>
           </p:cNvPr>
@@ -9337,8 +9471,8 @@
         </p:blipFill>
         <p:spPr>
           <a:xfrm>
-            <a:off x="493712" y="1752600"/>
-            <a:ext cx="11201400" cy="4138548"/>
+            <a:off x="802542" y="1676400"/>
+            <a:ext cx="10504976" cy="4724400"/>
           </a:xfrm>
           <a:prstGeom prst="rect">
             <a:avLst/>
@@ -9924,10 +10058,10 @@
       </p:sp>
       <p:pic>
         <p:nvPicPr>
-          <p:cNvPr id="4" name="Picture 3">
+          <p:cNvPr id="6" name="Picture 5">
             <a:extLst>
               <a:ext uri="{FF2B5EF4-FFF2-40B4-BE49-F238E27FC236}">
-                <a16:creationId xmlns:a16="http://schemas.microsoft.com/office/drawing/2014/main" id="{3B2003E6-D9B3-4A9F-BD16-D80B4E303070}"/>
+                <a16:creationId xmlns:a16="http://schemas.microsoft.com/office/drawing/2014/main" id="{1B699D45-2255-4ACE-BE42-50B2E680D381}"/>
               </a:ext>
             </a:extLst>
           </p:cNvPr>
@@ -9944,8 +10078,8 @@
         </p:blipFill>
         <p:spPr>
           <a:xfrm>
-            <a:off x="2449835" y="1864945"/>
-            <a:ext cx="7289151" cy="4859434"/>
+            <a:off x="2513420" y="1993900"/>
+            <a:ext cx="7365132" cy="4572000"/>
           </a:xfrm>
           <a:prstGeom prst="rect">
             <a:avLst/>
@@ -10024,6 +10158,78 @@
           <a:chExt cx="0" cy="0"/>
         </a:xfrm>
       </p:grpSpPr>
+      <p:pic>
+        <p:nvPicPr>
+          <p:cNvPr id="3" name="Picture 2">
+            <a:extLst>
+              <a:ext uri="{FF2B5EF4-FFF2-40B4-BE49-F238E27FC236}">
+                <a16:creationId xmlns:a16="http://schemas.microsoft.com/office/drawing/2014/main" id="{16E2E8B8-DDFC-4EF1-BB73-1596D701263E}"/>
+              </a:ext>
+            </a:extLst>
+          </p:cNvPr>
+          <p:cNvPicPr>
+            <a:picLocks noChangeAspect="1"/>
+          </p:cNvPicPr>
+          <p:nvPr/>
+        </p:nvPicPr>
+        <p:blipFill>
+          <a:blip r:embed="rId2"/>
+          <a:stretch>
+            <a:fillRect/>
+          </a:stretch>
+        </p:blipFill>
+        <p:spPr>
+          <a:xfrm>
+            <a:off x="0" y="892"/>
+            <a:ext cx="12190412" cy="6857107"/>
+          </a:xfrm>
+          <a:prstGeom prst="rect">
+            <a:avLst/>
+          </a:prstGeom>
+        </p:spPr>
+      </p:pic>
+    </p:spTree>
+    <p:extLst>
+      <p:ext uri="{BB962C8B-B14F-4D97-AF65-F5344CB8AC3E}">
+        <p14:creationId xmlns:p14="http://schemas.microsoft.com/office/powerpoint/2010/main" val="2227361192"/>
+      </p:ext>
+    </p:extLst>
+  </p:cSld>
+  <p:clrMapOvr>
+    <a:masterClrMapping/>
+  </p:clrMapOvr>
+  <mc:AlternateContent xmlns:mc="http://schemas.openxmlformats.org/markup-compatibility/2006" xmlns:p14="http://schemas.microsoft.com/office/powerpoint/2010/main">
+    <mc:Choice Requires="p14">
+      <p:transition spd="med" p14:dur="700">
+        <p:fade/>
+      </p:transition>
+    </mc:Choice>
+    <mc:Fallback xmlns="">
+      <p:transition spd="med">
+        <p:fade/>
+      </p:transition>
+    </mc:Fallback>
+  </mc:AlternateContent>
+</p:sld>
+</file>
+
+<file path=ppt/slides/slide8.xml><?xml version="1.0" encoding="utf-8"?>
+<p:sld xmlns:a="http://schemas.openxmlformats.org/drawingml/2006/main" xmlns:r="http://schemas.openxmlformats.org/officeDocument/2006/relationships" xmlns:p="http://schemas.openxmlformats.org/presentationml/2006/main">
+  <p:cSld>
+    <p:spTree>
+      <p:nvGrpSpPr>
+        <p:cNvPr id="1" name=""/>
+        <p:cNvGrpSpPr/>
+        <p:nvPr/>
+      </p:nvGrpSpPr>
+      <p:grpSpPr>
+        <a:xfrm>
+          <a:off x="0" y="0"/>
+          <a:ext cx="0" cy="0"/>
+          <a:chOff x="0" y="0"/>
+          <a:chExt cx="0" cy="0"/>
+        </a:xfrm>
+      </p:grpSpPr>
       <p:sp>
         <p:nvSpPr>
           <p:cNvPr id="2" name="Title 1">
@@ -10075,7 +10281,7 @@
           <a:p>
             <a:r>
               <a:rPr lang="en-US" dirty="0"/>
-              <a:t>Accessing the API</a:t>
+              <a:t>API Code</a:t>
             </a:r>
           </a:p>
           <a:p>
@@ -10085,10 +10291,10 @@
       </p:sp>
       <p:pic>
         <p:nvPicPr>
-          <p:cNvPr id="3" name="Picture 2">
+          <p:cNvPr id="5" name="Picture 4">
             <a:extLst>
               <a:ext uri="{FF2B5EF4-FFF2-40B4-BE49-F238E27FC236}">
-                <a16:creationId xmlns:a16="http://schemas.microsoft.com/office/drawing/2014/main" id="{F6DEBEF6-1EEB-4F3A-A2DC-B0012F07DC5D}"/>
+                <a16:creationId xmlns:a16="http://schemas.microsoft.com/office/drawing/2014/main" id="{5B51BBC0-1F28-4093-9E62-BB6C377FB5E5}"/>
               </a:ext>
             </a:extLst>
           </p:cNvPr>
@@ -10105,8 +10311,8 @@
         </p:blipFill>
         <p:spPr>
           <a:xfrm>
-            <a:off x="1370012" y="1219200"/>
-            <a:ext cx="8534400" cy="5354320"/>
+            <a:off x="1293567" y="1447800"/>
+            <a:ext cx="9601689" cy="4930597"/>
           </a:xfrm>
           <a:prstGeom prst="rect">
             <a:avLst/>
@@ -10168,7 +10374,7 @@
 </p:sld>
 </file>
 
-<file path=ppt/slides/slide8.xml><?xml version="1.0" encoding="utf-8"?>
+<file path=ppt/slides/slide9.xml><?xml version="1.0" encoding="utf-8"?>
 <p:sld xmlns:a="http://schemas.openxmlformats.org/drawingml/2006/main" xmlns:r="http://schemas.openxmlformats.org/officeDocument/2006/relationships" xmlns:p="http://schemas.openxmlformats.org/presentationml/2006/main">
   <p:cSld>
     <p:spTree>
@@ -10484,7 +10690,7 @@
         <p:spPr>
           <a:xfrm>
             <a:off x="2278703" y="689317"/>
-            <a:ext cx="7326618" cy="6216930"/>
+            <a:ext cx="7326618" cy="6043637"/>
           </a:xfrm>
           <a:prstGeom prst="rect">
             <a:avLst/>
@@ -10525,118 +10731,6 @@
     <p:extLst>
       <p:ext uri="{BB962C8B-B14F-4D97-AF65-F5344CB8AC3E}">
         <p14:creationId xmlns:p14="http://schemas.microsoft.com/office/powerpoint/2010/main" val="397904132"/>
-      </p:ext>
-    </p:extLst>
-  </p:cSld>
-  <p:clrMapOvr>
-    <a:masterClrMapping/>
-  </p:clrMapOvr>
-  <mc:AlternateContent xmlns:mc="http://schemas.openxmlformats.org/markup-compatibility/2006" xmlns:p14="http://schemas.microsoft.com/office/powerpoint/2010/main">
-    <mc:Choice Requires="p14">
-      <p:transition spd="med" p14:dur="700">
-        <p:fade/>
-      </p:transition>
-    </mc:Choice>
-    <mc:Fallback xmlns="">
-      <p:transition spd="med">
-        <p:fade/>
-      </p:transition>
-    </mc:Fallback>
-  </mc:AlternateContent>
-</p:sld>
-</file>
-
-<file path=ppt/slides/slide9.xml><?xml version="1.0" encoding="utf-8"?>
-<p:sld xmlns:a="http://schemas.openxmlformats.org/drawingml/2006/main" xmlns:r="http://schemas.openxmlformats.org/officeDocument/2006/relationships" xmlns:p="http://schemas.openxmlformats.org/presentationml/2006/main">
-  <p:cSld>
-    <p:spTree>
-      <p:nvGrpSpPr>
-        <p:cNvPr id="1" name=""/>
-        <p:cNvGrpSpPr/>
-        <p:nvPr/>
-      </p:nvGrpSpPr>
-      <p:grpSpPr>
-        <a:xfrm>
-          <a:off x="0" y="0"/>
-          <a:ext cx="0" cy="0"/>
-          <a:chOff x="0" y="0"/>
-          <a:chExt cx="0" cy="0"/>
-        </a:xfrm>
-      </p:grpSpPr>
-      <p:sp>
-        <p:nvSpPr>
-          <p:cNvPr id="4" name="Rectangle 3">
-            <a:extLst>
-              <a:ext uri="{FF2B5EF4-FFF2-40B4-BE49-F238E27FC236}">
-                <a16:creationId xmlns:a16="http://schemas.microsoft.com/office/drawing/2014/main" id="{70628A52-838D-40B7-81C9-0569CD9B66D2}"/>
-              </a:ext>
-            </a:extLst>
-          </p:cNvPr>
-          <p:cNvSpPr/>
-          <p:nvPr/>
-        </p:nvSpPr>
-        <p:spPr>
-          <a:xfrm>
-            <a:off x="2970212" y="228600"/>
-            <a:ext cx="6474849" cy="461665"/>
-          </a:xfrm>
-          <a:prstGeom prst="rect">
-            <a:avLst/>
-          </a:prstGeom>
-        </p:spPr>
-        <p:txBody>
-          <a:bodyPr wrap="none">
-            <a:spAutoFit/>
-          </a:bodyPr>
-          <a:lstStyle/>
-          <a:p>
-            <a:r>
-              <a:rPr lang="en-US" dirty="0">
-                <a:solidFill>
-                  <a:schemeClr val="accent2">
-                    <a:lumMod val="75000"/>
-                  </a:schemeClr>
-                </a:solidFill>
-              </a:rPr>
-              <a:t>Combined Demographics with Population</a:t>
-            </a:r>
-          </a:p>
-        </p:txBody>
-      </p:sp>
-      <p:pic>
-        <p:nvPicPr>
-          <p:cNvPr id="9" name="Picture 8">
-            <a:extLst>
-              <a:ext uri="{FF2B5EF4-FFF2-40B4-BE49-F238E27FC236}">
-                <a16:creationId xmlns:a16="http://schemas.microsoft.com/office/drawing/2014/main" id="{F803309D-787F-499E-81EA-6B367EF5DF5B}"/>
-              </a:ext>
-            </a:extLst>
-          </p:cNvPr>
-          <p:cNvPicPr>
-            <a:picLocks noChangeAspect="1"/>
-          </p:cNvPicPr>
-          <p:nvPr/>
-        </p:nvPicPr>
-        <p:blipFill>
-          <a:blip r:embed="rId2"/>
-          <a:stretch>
-            <a:fillRect/>
-          </a:stretch>
-        </p:blipFill>
-        <p:spPr>
-          <a:xfrm>
-            <a:off x="912812" y="785289"/>
-            <a:ext cx="10301227" cy="5672929"/>
-          </a:xfrm>
-          <a:prstGeom prst="rect">
-            <a:avLst/>
-          </a:prstGeom>
-        </p:spPr>
-      </p:pic>
-    </p:spTree>
-    <p:extLst>
-      <p:ext uri="{BB962C8B-B14F-4D97-AF65-F5344CB8AC3E}">
-        <p14:creationId xmlns:p14="http://schemas.microsoft.com/office/powerpoint/2010/main" val="977229791"/>
       </p:ext>
     </p:extLst>
   </p:cSld>

</xml_diff>